<commit_message>
Deleted a slide with an older product mentioned
</commit_message>
<xml_diff>
--- a/presentations/05-Automation.pptx
+++ b/presentations/05-Automation.pptx
@@ -7,7 +7,7 @@
     <p:sldMasterId id="2147483678" r:id="rId3"/>
   </p:sldMasterIdLst>
   <p:notesMasterIdLst>
-    <p:notesMasterId r:id="rId27"/>
+    <p:notesMasterId r:id="rId26"/>
   </p:notesMasterIdLst>
   <p:sldIdLst>
     <p:sldId id="282" r:id="rId4"/>
@@ -31,27 +31,30 @@
     <p:sldId id="272" r:id="rId22"/>
     <p:sldId id="273" r:id="rId23"/>
     <p:sldId id="274" r:id="rId24"/>
-    <p:sldId id="275" r:id="rId25"/>
-    <p:sldId id="281" r:id="rId26"/>
+    <p:sldId id="281" r:id="rId25"/>
   </p:sldIdLst>
   <p:sldSz cx="9144000" cy="5143500" type="screen16x9"/>
   <p:notesSz cx="7010400" cy="9296400"/>
   <p:embeddedFontLst>
     <p:embeddedFont>
-      <p:font typeface="Intel Clear Light" panose="020B0404020203020204" pitchFamily="34" charset="0"/>
-      <p:regular r:id="rId28"/>
+      <p:font typeface="Intel Clear" panose="020B0604020203020204" pitchFamily="34" charset="0"/>
+      <p:regular r:id="rId27"/>
+      <p:bold r:id="rId28"/>
       <p:italic r:id="rId29"/>
+      <p:boldItalic r:id="rId30"/>
+    </p:embeddedFont>
+    <p:embeddedFont>
+      <p:font typeface="Roboto" panose="02000000000000000000" pitchFamily="2" charset="0"/>
+      <p:regular r:id="rId31"/>
     </p:embeddedFont>
     <p:embeddedFont>
       <p:font typeface="Intel Clear Pro" panose="020B0804020202060201" pitchFamily="34" charset="0"/>
-      <p:bold r:id="rId30"/>
+      <p:bold r:id="rId32"/>
     </p:embeddedFont>
     <p:embeddedFont>
-      <p:font typeface="Intel Clear" panose="020B0604020203020204" pitchFamily="34" charset="0"/>
-      <p:regular r:id="rId31"/>
-      <p:bold r:id="rId32"/>
-      <p:italic r:id="rId33"/>
-      <p:boldItalic r:id="rId34"/>
+      <p:font typeface="Intel Clear Light" panose="020B0404020203020204" pitchFamily="34" charset="0"/>
+      <p:regular r:id="rId33"/>
+      <p:italic r:id="rId34"/>
     </p:embeddedFont>
     <p:embeddedFont>
       <p:font typeface="Calibri" panose="020F0502020204030204" pitchFamily="34" charset="0"/>
@@ -59,10 +62,6 @@
       <p:bold r:id="rId36"/>
       <p:italic r:id="rId37"/>
       <p:boldItalic r:id="rId38"/>
-    </p:embeddedFont>
-    <p:embeddedFont>
-      <p:font typeface="Roboto" panose="02000000000000000000" pitchFamily="2" charset="0"/>
-      <p:regular r:id="rId39"/>
     </p:embeddedFont>
   </p:embeddedFontLst>
   <p:defaultTextStyle>
@@ -2338,127 +2337,6 @@
   <p:cSld>
     <p:spTree>
       <p:nvGrpSpPr>
-        <p:cNvPr id="1" name="Shape 508"/>
-        <p:cNvGrpSpPr/>
-        <p:nvPr/>
-      </p:nvGrpSpPr>
-      <p:grpSpPr>
-        <a:xfrm>
-          <a:off x="0" y="0"/>
-          <a:ext cx="0" cy="0"/>
-          <a:chOff x="0" y="0"/>
-          <a:chExt cx="0" cy="0"/>
-        </a:xfrm>
-      </p:grpSpPr>
-      <p:sp>
-        <p:nvSpPr>
-          <p:cNvPr id="509" name="Shape 509"/>
-          <p:cNvSpPr>
-            <a:spLocks noGrp="1" noRot="1" noChangeAspect="1"/>
-          </p:cNvSpPr>
-          <p:nvPr>
-            <p:ph type="sldImg" idx="2"/>
-          </p:nvPr>
-        </p:nvSpPr>
-        <p:spPr>
-          <a:xfrm>
-            <a:off x="406400" y="696913"/>
-            <a:ext cx="6197600" cy="3486150"/>
-          </a:xfrm>
-          <a:custGeom>
-            <a:avLst/>
-            <a:gdLst/>
-            <a:ahLst/>
-            <a:cxnLst/>
-            <a:rect l="0" t="0" r="0" b="0"/>
-            <a:pathLst>
-              <a:path w="120000" h="120000" extrusionOk="0">
-                <a:moveTo>
-                  <a:pt x="0" y="0"/>
-                </a:moveTo>
-                <a:lnTo>
-                  <a:pt x="120000" y="0"/>
-                </a:lnTo>
-                <a:lnTo>
-                  <a:pt x="120000" y="120000"/>
-                </a:lnTo>
-                <a:lnTo>
-                  <a:pt x="0" y="120000"/>
-                </a:lnTo>
-                <a:close/>
-              </a:path>
-            </a:pathLst>
-          </a:custGeom>
-          <a:noFill/>
-          <a:ln w="9525" cap="flat" cmpd="sng">
-            <a:solidFill>
-              <a:srgbClr val="000000"/>
-            </a:solidFill>
-            <a:prstDash val="solid"/>
-            <a:round/>
-            <a:headEnd type="none" w="med" len="med"/>
-            <a:tailEnd type="none" w="med" len="med"/>
-          </a:ln>
-        </p:spPr>
-      </p:sp>
-      <p:sp>
-        <p:nvSpPr>
-          <p:cNvPr id="510" name="Shape 510"/>
-          <p:cNvSpPr txBox="1">
-            <a:spLocks noGrp="1"/>
-          </p:cNvSpPr>
-          <p:nvPr>
-            <p:ph type="body" idx="1"/>
-          </p:nvPr>
-        </p:nvSpPr>
-        <p:spPr>
-          <a:xfrm>
-            <a:off x="701041" y="4415790"/>
-            <a:ext cx="5608319" cy="4183380"/>
-          </a:xfrm>
-          <a:prstGeom prst="rect">
-            <a:avLst/>
-          </a:prstGeom>
-          <a:noFill/>
-          <a:ln>
-            <a:noFill/>
-          </a:ln>
-        </p:spPr>
-        <p:txBody>
-          <a:bodyPr wrap="square" lIns="93162" tIns="93162" rIns="93162" bIns="93162" anchor="t" anchorCtr="0">
-            <a:noAutofit/>
-          </a:bodyPr>
-          <a:lstStyle/>
-          <a:p>
-            <a:pPr>
-              <a:buClr>
-                <a:schemeClr val="dk1"/>
-              </a:buClr>
-              <a:buSzPct val="25000"/>
-              <a:buNone/>
-            </a:pPr>
-            <a:endParaRPr/>
-          </a:p>
-        </p:txBody>
-      </p:sp>
-    </p:spTree>
-    <p:extLst>
-      <p:ext uri="{BB962C8B-B14F-4D97-AF65-F5344CB8AC3E}">
-        <p14:creationId xmlns:p14="http://schemas.microsoft.com/office/powerpoint/2010/main" val="405846421"/>
-      </p:ext>
-    </p:extLst>
-  </p:cSld>
-  <p:clrMapOvr>
-    <a:masterClrMapping/>
-  </p:clrMapOvr>
-</p:notes>
-</file>
-
-<file path=ppt/notesSlides/notesSlide22.xml><?xml version="1.0" encoding="utf-8"?>
-<p:notes xmlns:a="http://schemas.openxmlformats.org/drawingml/2006/main" xmlns:r="http://schemas.openxmlformats.org/officeDocument/2006/relationships" xmlns:p="http://schemas.openxmlformats.org/presentationml/2006/main" showMasterSp="0" showMasterPhAnim="0">
-  <p:cSld>
-    <p:spTree>
-      <p:nvGrpSpPr>
         <p:cNvPr id="1" name="Shape 544"/>
         <p:cNvGrpSpPr/>
         <p:nvPr/>
@@ -28578,432 +28456,6 @@
 </file>
 
 <file path=ppt/slides/slide22.xml><?xml version="1.0" encoding="utf-8"?>
-<p:sld xmlns:a="http://schemas.openxmlformats.org/drawingml/2006/main" xmlns:r="http://schemas.openxmlformats.org/officeDocument/2006/relationships" xmlns:p="http://schemas.openxmlformats.org/presentationml/2006/main">
-  <p:cSld>
-    <p:spTree>
-      <p:nvGrpSpPr>
-        <p:cNvPr id="1" name="Shape 511"/>
-        <p:cNvGrpSpPr/>
-        <p:nvPr/>
-      </p:nvGrpSpPr>
-      <p:grpSpPr>
-        <a:xfrm>
-          <a:off x="0" y="0"/>
-          <a:ext cx="0" cy="0"/>
-          <a:chOff x="0" y="0"/>
-          <a:chExt cx="0" cy="0"/>
-        </a:xfrm>
-      </p:grpSpPr>
-      <p:sp>
-        <p:nvSpPr>
-          <p:cNvPr id="512" name="Shape 512"/>
-          <p:cNvSpPr txBox="1">
-            <a:spLocks noGrp="1"/>
-          </p:cNvSpPr>
-          <p:nvPr>
-            <p:ph type="title"/>
-          </p:nvPr>
-        </p:nvSpPr>
-        <p:spPr>
-          <a:xfrm>
-            <a:off x="98250" y="16350"/>
-            <a:ext cx="8826599" cy="602700"/>
-          </a:xfrm>
-          <a:prstGeom prst="rect">
-            <a:avLst/>
-          </a:prstGeom>
-          <a:noFill/>
-          <a:ln>
-            <a:noFill/>
-          </a:ln>
-        </p:spPr>
-        <p:txBody>
-          <a:bodyPr wrap="square" lIns="91425" tIns="91425" rIns="91425" bIns="91425" anchor="ctr" anchorCtr="0">
-            <a:noAutofit/>
-          </a:bodyPr>
-          <a:lstStyle/>
-          <a:p>
-            <a:pPr marL="0" marR="0" lvl="0" indent="0" algn="l" rtl="0">
-              <a:lnSpc>
-                <a:spcPct val="100000"/>
-              </a:lnSpc>
-              <a:spcBef>
-                <a:spcPts val="0"/>
-              </a:spcBef>
-              <a:spcAft>
-                <a:spcPts val="0"/>
-              </a:spcAft>
-              <a:buClr>
-                <a:schemeClr val="lt1"/>
-              </a:buClr>
-              <a:buSzPct val="25000"/>
-              <a:buFont typeface="Roboto"/>
-              <a:buNone/>
-            </a:pPr>
-            <a:r>
-              <a:rPr lang="en" sz="1800" b="0" i="0" u="none" strike="noStrike" cap="none">
-                <a:solidFill>
-                  <a:schemeClr val="lt1"/>
-                </a:solidFill>
-                <a:latin typeface="Roboto"/>
-                <a:ea typeface="Roboto"/>
-                <a:cs typeface="Roboto"/>
-                <a:sym typeface="Roboto"/>
-              </a:rPr>
-              <a:t>Example HTTP Trigger Function</a:t>
-            </a:r>
-          </a:p>
-        </p:txBody>
-      </p:sp>
-      <p:sp>
-        <p:nvSpPr>
-          <p:cNvPr id="513" name="Shape 513"/>
-          <p:cNvSpPr txBox="1"/>
-          <p:nvPr/>
-        </p:nvSpPr>
-        <p:spPr>
-          <a:xfrm>
-            <a:off x="98250" y="778650"/>
-            <a:ext cx="2425199" cy="4166100"/>
-          </a:xfrm>
-          <a:prstGeom prst="rect">
-            <a:avLst/>
-          </a:prstGeom>
-          <a:noFill/>
-          <a:ln>
-            <a:noFill/>
-          </a:ln>
-        </p:spPr>
-        <p:txBody>
-          <a:bodyPr wrap="square" lIns="91425" tIns="91425" rIns="91425" bIns="91425" anchor="t" anchorCtr="0">
-            <a:noAutofit/>
-          </a:bodyPr>
-          <a:lstStyle/>
-          <a:p>
-            <a:pPr marL="0" marR="0" lvl="0" indent="0" algn="l" rtl="0">
-              <a:lnSpc>
-                <a:spcPct val="100000"/>
-              </a:lnSpc>
-              <a:spcBef>
-                <a:spcPts val="0"/>
-              </a:spcBef>
-              <a:spcAft>
-                <a:spcPts val="0"/>
-              </a:spcAft>
-              <a:buClr>
-                <a:srgbClr val="666666"/>
-              </a:buClr>
-              <a:buSzPct val="25000"/>
-              <a:buFont typeface="Roboto"/>
-              <a:buNone/>
-            </a:pPr>
-            <a:r>
-              <a:rPr lang="en" sz="1400" b="0" i="0" u="none" strike="noStrike" cap="none">
-                <a:solidFill>
-                  <a:srgbClr val="666666"/>
-                </a:solidFill>
-                <a:latin typeface="Roboto"/>
-                <a:ea typeface="Roboto"/>
-                <a:cs typeface="Roboto"/>
-                <a:sym typeface="Roboto"/>
-              </a:rPr>
-              <a:t>Example Trigger Function</a:t>
-            </a:r>
-          </a:p>
-          <a:p>
-            <a:pPr marL="0" marR="0" lvl="0" indent="0" algn="l" rtl="0">
-              <a:lnSpc>
-                <a:spcPct val="100000"/>
-              </a:lnSpc>
-              <a:spcBef>
-                <a:spcPts val="0"/>
-              </a:spcBef>
-              <a:spcAft>
-                <a:spcPts val="0"/>
-              </a:spcAft>
-              <a:buClr>
-                <a:srgbClr val="000000"/>
-              </a:buClr>
-              <a:buFont typeface="Arial"/>
-              <a:buNone/>
-            </a:pPr>
-            <a:endParaRPr sz="1400" b="0" i="0" u="none" strike="noStrike" cap="none">
-              <a:solidFill>
-                <a:srgbClr val="666666"/>
-              </a:solidFill>
-              <a:latin typeface="Roboto"/>
-              <a:ea typeface="Roboto"/>
-              <a:cs typeface="Roboto"/>
-              <a:sym typeface="Roboto"/>
-            </a:endParaRPr>
-          </a:p>
-          <a:p>
-            <a:pPr marL="0" marR="0" lvl="0" indent="0" algn="l" rtl="0">
-              <a:lnSpc>
-                <a:spcPct val="100000"/>
-              </a:lnSpc>
-              <a:spcBef>
-                <a:spcPts val="0"/>
-              </a:spcBef>
-              <a:spcAft>
-                <a:spcPts val="0"/>
-              </a:spcAft>
-              <a:buClr>
-                <a:srgbClr val="666666"/>
-              </a:buClr>
-              <a:buSzPct val="25000"/>
-              <a:buFont typeface="Roboto"/>
-              <a:buNone/>
-            </a:pPr>
-            <a:r>
-              <a:rPr lang="en" sz="1400" b="0" i="0" u="none" strike="noStrike" cap="none">
-                <a:solidFill>
-                  <a:srgbClr val="666666"/>
-                </a:solidFill>
-                <a:latin typeface="Roboto"/>
-                <a:ea typeface="Roboto"/>
-                <a:cs typeface="Roboto"/>
-                <a:sym typeface="Roboto"/>
-              </a:rPr>
-              <a:t>Create an HTTP POST request for the Intel Edison with the LCD.</a:t>
-            </a:r>
-          </a:p>
-          <a:p>
-            <a:pPr marL="0" marR="0" lvl="0" indent="0" algn="l" rtl="0">
-              <a:lnSpc>
-                <a:spcPct val="100000"/>
-              </a:lnSpc>
-              <a:spcBef>
-                <a:spcPts val="0"/>
-              </a:spcBef>
-              <a:spcAft>
-                <a:spcPts val="0"/>
-              </a:spcAft>
-              <a:buClr>
-                <a:srgbClr val="000000"/>
-              </a:buClr>
-              <a:buFont typeface="Arial"/>
-              <a:buNone/>
-            </a:pPr>
-            <a:endParaRPr sz="1400" b="0" i="0" u="none" strike="noStrike" cap="none">
-              <a:solidFill>
-                <a:srgbClr val="666666"/>
-              </a:solidFill>
-              <a:latin typeface="Roboto"/>
-              <a:ea typeface="Roboto"/>
-              <a:cs typeface="Roboto"/>
-              <a:sym typeface="Roboto"/>
-            </a:endParaRPr>
-          </a:p>
-          <a:p>
-            <a:pPr marL="0" marR="0" lvl="0" indent="0" algn="l" rtl="0">
-              <a:lnSpc>
-                <a:spcPct val="100000"/>
-              </a:lnSpc>
-              <a:spcBef>
-                <a:spcPts val="0"/>
-              </a:spcBef>
-              <a:spcAft>
-                <a:spcPts val="0"/>
-              </a:spcAft>
-              <a:buClr>
-                <a:srgbClr val="666666"/>
-              </a:buClr>
-              <a:buSzPct val="25000"/>
-              <a:buFont typeface="Roboto"/>
-              <a:buNone/>
-            </a:pPr>
-            <a:r>
-              <a:rPr lang="en" sz="1400" b="0" i="0" u="none" strike="noStrike" cap="none">
-                <a:solidFill>
-                  <a:srgbClr val="666666"/>
-                </a:solidFill>
-                <a:latin typeface="Roboto"/>
-                <a:ea typeface="Roboto"/>
-                <a:cs typeface="Roboto"/>
-                <a:sym typeface="Roboto"/>
-              </a:rPr>
-              <a:t>Send the HTTP request with the </a:t>
-            </a:r>
-            <a:r>
-              <a:rPr lang="en" sz="1400" b="1" i="0" u="none" strike="noStrike" cap="none">
-                <a:solidFill>
-                  <a:srgbClr val="666666"/>
-                </a:solidFill>
-                <a:latin typeface="Roboto"/>
-                <a:ea typeface="Roboto"/>
-                <a:cs typeface="Roboto"/>
-                <a:sym typeface="Roboto"/>
-              </a:rPr>
-              <a:t>this.http </a:t>
-            </a:r>
-            <a:r>
-              <a:rPr lang="en" sz="1400" b="0" i="0" u="none" strike="noStrike" cap="none">
-                <a:solidFill>
-                  <a:srgbClr val="666666"/>
-                </a:solidFill>
-                <a:latin typeface="Roboto"/>
-                <a:ea typeface="Roboto"/>
-                <a:cs typeface="Roboto"/>
-                <a:sym typeface="Roboto"/>
-              </a:rPr>
-              <a:t>object.</a:t>
-            </a:r>
-          </a:p>
-          <a:p>
-            <a:pPr marL="0" marR="0" lvl="0" indent="0" algn="l" rtl="0">
-              <a:lnSpc>
-                <a:spcPct val="100000"/>
-              </a:lnSpc>
-              <a:spcBef>
-                <a:spcPts val="0"/>
-              </a:spcBef>
-              <a:spcAft>
-                <a:spcPts val="0"/>
-              </a:spcAft>
-              <a:buClr>
-                <a:srgbClr val="000000"/>
-              </a:buClr>
-              <a:buFont typeface="Arial"/>
-              <a:buNone/>
-            </a:pPr>
-            <a:endParaRPr sz="1400" b="0" i="0" u="none" strike="noStrike" cap="none">
-              <a:solidFill>
-                <a:srgbClr val="666666"/>
-              </a:solidFill>
-              <a:latin typeface="Roboto"/>
-              <a:ea typeface="Roboto"/>
-              <a:cs typeface="Roboto"/>
-              <a:sym typeface="Roboto"/>
-            </a:endParaRPr>
-          </a:p>
-          <a:p>
-            <a:pPr marL="0" marR="0" lvl="0" indent="0" algn="l" rtl="0">
-              <a:lnSpc>
-                <a:spcPct val="100000"/>
-              </a:lnSpc>
-              <a:spcBef>
-                <a:spcPts val="0"/>
-              </a:spcBef>
-              <a:spcAft>
-                <a:spcPts val="0"/>
-              </a:spcAft>
-              <a:buClr>
-                <a:srgbClr val="666666"/>
-              </a:buClr>
-              <a:buSzPct val="25000"/>
-              <a:buFont typeface="Roboto"/>
-              <a:buNone/>
-            </a:pPr>
-            <a:r>
-              <a:rPr lang="en" sz="1400" b="0" i="0" u="none" strike="noStrike" cap="none">
-                <a:solidFill>
-                  <a:srgbClr val="666666"/>
-                </a:solidFill>
-                <a:latin typeface="Roboto"/>
-                <a:ea typeface="Roboto"/>
-                <a:cs typeface="Roboto"/>
-                <a:sym typeface="Roboto"/>
-              </a:rPr>
-              <a:t>Write two functions to handle the  success and error conditions.</a:t>
-            </a:r>
-          </a:p>
-          <a:p>
-            <a:pPr marL="0" marR="0" lvl="0" indent="0" algn="l" rtl="0">
-              <a:lnSpc>
-                <a:spcPct val="100000"/>
-              </a:lnSpc>
-              <a:spcBef>
-                <a:spcPts val="0"/>
-              </a:spcBef>
-              <a:spcAft>
-                <a:spcPts val="0"/>
-              </a:spcAft>
-              <a:buClr>
-                <a:srgbClr val="000000"/>
-              </a:buClr>
-              <a:buFont typeface="Arial"/>
-              <a:buNone/>
-            </a:pPr>
-            <a:endParaRPr sz="1400" b="0" i="0" u="none" strike="noStrike" cap="none">
-              <a:solidFill>
-                <a:srgbClr val="666666"/>
-              </a:solidFill>
-              <a:latin typeface="Roboto"/>
-              <a:ea typeface="Roboto"/>
-              <a:cs typeface="Roboto"/>
-              <a:sym typeface="Roboto"/>
-            </a:endParaRPr>
-          </a:p>
-          <a:p>
-            <a:pPr marL="0" marR="0" lvl="0" indent="0" algn="l" rtl="0">
-              <a:lnSpc>
-                <a:spcPct val="100000"/>
-              </a:lnSpc>
-              <a:spcBef>
-                <a:spcPts val="0"/>
-              </a:spcBef>
-              <a:spcAft>
-                <a:spcPts val="0"/>
-              </a:spcAft>
-              <a:buClr>
-                <a:srgbClr val="666666"/>
-              </a:buClr>
-              <a:buSzPct val="25000"/>
-              <a:buFont typeface="Roboto"/>
-              <a:buNone/>
-            </a:pPr>
-            <a:r>
-              <a:rPr lang="en" sz="1400" b="1" i="0" u="none" strike="noStrike" cap="none">
-                <a:solidFill>
-                  <a:srgbClr val="666666"/>
-                </a:solidFill>
-                <a:latin typeface="Roboto"/>
-                <a:ea typeface="Roboto"/>
-                <a:cs typeface="Roboto"/>
-                <a:sym typeface="Roboto"/>
-              </a:rPr>
-              <a:t>Be sure to put the parentheses around the entire function</a:t>
-            </a:r>
-          </a:p>
-        </p:txBody>
-      </p:sp>
-      <p:pic>
-        <p:nvPicPr>
-          <p:cNvPr id="514" name="Shape 514"/>
-          <p:cNvPicPr preferRelativeResize="0"/>
-          <p:nvPr/>
-        </p:nvPicPr>
-        <p:blipFill rotWithShape="1">
-          <a:blip r:embed="rId3">
-            <a:alphaModFix/>
-          </a:blip>
-          <a:srcRect/>
-          <a:stretch/>
-        </p:blipFill>
-        <p:spPr>
-          <a:xfrm>
-            <a:off x="2501090" y="778650"/>
-            <a:ext cx="6423758" cy="4166100"/>
-          </a:xfrm>
-          <a:prstGeom prst="rect">
-            <a:avLst/>
-          </a:prstGeom>
-          <a:noFill/>
-          <a:ln>
-            <a:noFill/>
-          </a:ln>
-        </p:spPr>
-      </p:pic>
-    </p:spTree>
-  </p:cSld>
-  <p:clrMapOvr>
-    <a:masterClrMapping/>
-  </p:clrMapOvr>
-</p:sld>
-</file>
-
-<file path=ppt/slides/slide23.xml><?xml version="1.0" encoding="utf-8"?>
 <p:sld xmlns:a="http://schemas.openxmlformats.org/drawingml/2006/main" xmlns:r="http://schemas.openxmlformats.org/officeDocument/2006/relationships" xmlns:p="http://schemas.openxmlformats.org/presentationml/2006/main">
   <p:cSld>
     <p:spTree>

</xml_diff>